<commit_message>
39 select case explicacao
</commit_message>
<xml_diff>
--- a/004-estruturasDoVba/39-estruturaSelectCase-explicacao.pptx
+++ b/004-estruturasDoVba/39-estruturaSelectCase-explicacao.pptx
@@ -211,7 +211,7 @@
           <a:p>
             <a:fld id="{75A3F3D2-63A5-48AA-BA1A-E92A30A8F56B}" type="datetimeFigureOut">
               <a:rPr lang="pt-BR" smtClean="0"/>
-              <a:t>23/08/2019</a:t>
+              <a:t>02/09/2023</a:t>
             </a:fld>
             <a:endParaRPr lang="pt-BR"/>
           </a:p>
@@ -369,7 +369,7 @@
           <a:p>
             <a:fld id="{7AD1B41A-3347-4392-9D5C-B52141BF6A5A}" type="slidenum">
               <a:rPr lang="pt-BR" smtClean="0"/>
-              <a:t>‹nº›</a:t>
+              <a:t>‹#›</a:t>
             </a:fld>
             <a:endParaRPr lang="pt-BR"/>
           </a:p>
@@ -607,7 +607,7 @@
           <a:p>
             <a:fld id="{32B683BF-5146-4529-A0D3-BC1077F51968}" type="datetimeFigureOut">
               <a:rPr lang="pt-BR" smtClean="0"/>
-              <a:t>23/08/2019</a:t>
+              <a:t>02/09/2023</a:t>
             </a:fld>
             <a:endParaRPr lang="pt-BR"/>
           </a:p>
@@ -649,7 +649,7 @@
           <a:p>
             <a:fld id="{6DB0D030-D7E2-46DF-89B5-F9C2519DD263}" type="slidenum">
               <a:rPr lang="pt-BR" smtClean="0"/>
-              <a:t>‹nº›</a:t>
+              <a:t>‹#›</a:t>
             </a:fld>
             <a:endParaRPr lang="pt-BR"/>
           </a:p>
@@ -775,7 +775,7 @@
           <a:p>
             <a:fld id="{32B683BF-5146-4529-A0D3-BC1077F51968}" type="datetimeFigureOut">
               <a:rPr lang="pt-BR" smtClean="0"/>
-              <a:t>23/08/2019</a:t>
+              <a:t>02/09/2023</a:t>
             </a:fld>
             <a:endParaRPr lang="pt-BR"/>
           </a:p>
@@ -817,7 +817,7 @@
           <a:p>
             <a:fld id="{6DB0D030-D7E2-46DF-89B5-F9C2519DD263}" type="slidenum">
               <a:rPr lang="pt-BR" smtClean="0"/>
-              <a:t>‹nº›</a:t>
+              <a:t>‹#›</a:t>
             </a:fld>
             <a:endParaRPr lang="pt-BR"/>
           </a:p>
@@ -953,7 +953,7 @@
           <a:p>
             <a:fld id="{32B683BF-5146-4529-A0D3-BC1077F51968}" type="datetimeFigureOut">
               <a:rPr lang="pt-BR" smtClean="0"/>
-              <a:t>23/08/2019</a:t>
+              <a:t>02/09/2023</a:t>
             </a:fld>
             <a:endParaRPr lang="pt-BR"/>
           </a:p>
@@ -995,7 +995,7 @@
           <a:p>
             <a:fld id="{6DB0D030-D7E2-46DF-89B5-F9C2519DD263}" type="slidenum">
               <a:rPr lang="pt-BR" smtClean="0"/>
-              <a:t>‹nº›</a:t>
+              <a:t>‹#›</a:t>
             </a:fld>
             <a:endParaRPr lang="pt-BR"/>
           </a:p>
@@ -1121,7 +1121,7 @@
           <a:p>
             <a:fld id="{32B683BF-5146-4529-A0D3-BC1077F51968}" type="datetimeFigureOut">
               <a:rPr lang="pt-BR" smtClean="0"/>
-              <a:t>23/08/2019</a:t>
+              <a:t>02/09/2023</a:t>
             </a:fld>
             <a:endParaRPr lang="pt-BR"/>
           </a:p>
@@ -1163,7 +1163,7 @@
           <a:p>
             <a:fld id="{6DB0D030-D7E2-46DF-89B5-F9C2519DD263}" type="slidenum">
               <a:rPr lang="pt-BR" smtClean="0"/>
-              <a:t>‹nº›</a:t>
+              <a:t>‹#›</a:t>
             </a:fld>
             <a:endParaRPr lang="pt-BR"/>
           </a:p>
@@ -1366,7 +1366,7 @@
           <a:p>
             <a:fld id="{32B683BF-5146-4529-A0D3-BC1077F51968}" type="datetimeFigureOut">
               <a:rPr lang="pt-BR" smtClean="0"/>
-              <a:t>23/08/2019</a:t>
+              <a:t>02/09/2023</a:t>
             </a:fld>
             <a:endParaRPr lang="pt-BR"/>
           </a:p>
@@ -1408,7 +1408,7 @@
           <a:p>
             <a:fld id="{6DB0D030-D7E2-46DF-89B5-F9C2519DD263}" type="slidenum">
               <a:rPr lang="pt-BR" smtClean="0"/>
-              <a:t>‹nº›</a:t>
+              <a:t>‹#›</a:t>
             </a:fld>
             <a:endParaRPr lang="pt-BR"/>
           </a:p>
@@ -1595,7 +1595,7 @@
           <a:p>
             <a:fld id="{32B683BF-5146-4529-A0D3-BC1077F51968}" type="datetimeFigureOut">
               <a:rPr lang="pt-BR" smtClean="0"/>
-              <a:t>23/08/2019</a:t>
+              <a:t>02/09/2023</a:t>
             </a:fld>
             <a:endParaRPr lang="pt-BR"/>
           </a:p>
@@ -1637,7 +1637,7 @@
           <a:p>
             <a:fld id="{6DB0D030-D7E2-46DF-89B5-F9C2519DD263}" type="slidenum">
               <a:rPr lang="pt-BR" smtClean="0"/>
-              <a:t>‹nº›</a:t>
+              <a:t>‹#›</a:t>
             </a:fld>
             <a:endParaRPr lang="pt-BR"/>
           </a:p>
@@ -1959,7 +1959,7 @@
           <a:p>
             <a:fld id="{32B683BF-5146-4529-A0D3-BC1077F51968}" type="datetimeFigureOut">
               <a:rPr lang="pt-BR" smtClean="0"/>
-              <a:t>23/08/2019</a:t>
+              <a:t>02/09/2023</a:t>
             </a:fld>
             <a:endParaRPr lang="pt-BR"/>
           </a:p>
@@ -2001,7 +2001,7 @@
           <a:p>
             <a:fld id="{6DB0D030-D7E2-46DF-89B5-F9C2519DD263}" type="slidenum">
               <a:rPr lang="pt-BR" smtClean="0"/>
-              <a:t>‹nº›</a:t>
+              <a:t>‹#›</a:t>
             </a:fld>
             <a:endParaRPr lang="pt-BR"/>
           </a:p>
@@ -2076,7 +2076,7 @@
           <a:p>
             <a:fld id="{32B683BF-5146-4529-A0D3-BC1077F51968}" type="datetimeFigureOut">
               <a:rPr lang="pt-BR" smtClean="0"/>
-              <a:t>23/08/2019</a:t>
+              <a:t>02/09/2023</a:t>
             </a:fld>
             <a:endParaRPr lang="pt-BR"/>
           </a:p>
@@ -2118,7 +2118,7 @@
           <a:p>
             <a:fld id="{6DB0D030-D7E2-46DF-89B5-F9C2519DD263}" type="slidenum">
               <a:rPr lang="pt-BR" smtClean="0"/>
-              <a:t>‹nº›</a:t>
+              <a:t>‹#›</a:t>
             </a:fld>
             <a:endParaRPr lang="pt-BR"/>
           </a:p>
@@ -2171,7 +2171,7 @@
           <a:p>
             <a:fld id="{32B683BF-5146-4529-A0D3-BC1077F51968}" type="datetimeFigureOut">
               <a:rPr lang="pt-BR" smtClean="0"/>
-              <a:t>23/08/2019</a:t>
+              <a:t>02/09/2023</a:t>
             </a:fld>
             <a:endParaRPr lang="pt-BR"/>
           </a:p>
@@ -2213,7 +2213,7 @@
           <a:p>
             <a:fld id="{6DB0D030-D7E2-46DF-89B5-F9C2519DD263}" type="slidenum">
               <a:rPr lang="pt-BR" smtClean="0"/>
-              <a:t>‹nº›</a:t>
+              <a:t>‹#›</a:t>
             </a:fld>
             <a:endParaRPr lang="pt-BR"/>
           </a:p>
@@ -2446,7 +2446,7 @@
           <a:p>
             <a:fld id="{32B683BF-5146-4529-A0D3-BC1077F51968}" type="datetimeFigureOut">
               <a:rPr lang="pt-BR" smtClean="0"/>
-              <a:t>23/08/2019</a:t>
+              <a:t>02/09/2023</a:t>
             </a:fld>
             <a:endParaRPr lang="pt-BR"/>
           </a:p>
@@ -2488,7 +2488,7 @@
           <a:p>
             <a:fld id="{6DB0D030-D7E2-46DF-89B5-F9C2519DD263}" type="slidenum">
               <a:rPr lang="pt-BR" smtClean="0"/>
-              <a:t>‹nº›</a:t>
+              <a:t>‹#›</a:t>
             </a:fld>
             <a:endParaRPr lang="pt-BR"/>
           </a:p>
@@ -2698,7 +2698,7 @@
           <a:p>
             <a:fld id="{32B683BF-5146-4529-A0D3-BC1077F51968}" type="datetimeFigureOut">
               <a:rPr lang="pt-BR" smtClean="0"/>
-              <a:t>23/08/2019</a:t>
+              <a:t>02/09/2023</a:t>
             </a:fld>
             <a:endParaRPr lang="pt-BR"/>
           </a:p>
@@ -2740,7 +2740,7 @@
           <a:p>
             <a:fld id="{6DB0D030-D7E2-46DF-89B5-F9C2519DD263}" type="slidenum">
               <a:rPr lang="pt-BR" smtClean="0"/>
-              <a:t>‹nº›</a:t>
+              <a:t>‹#›</a:t>
             </a:fld>
             <a:endParaRPr lang="pt-BR"/>
           </a:p>
@@ -2909,7 +2909,7 @@
           <a:p>
             <a:fld id="{32B683BF-5146-4529-A0D3-BC1077F51968}" type="datetimeFigureOut">
               <a:rPr lang="pt-BR" smtClean="0"/>
-              <a:t>23/08/2019</a:t>
+              <a:t>02/09/2023</a:t>
             </a:fld>
             <a:endParaRPr lang="pt-BR"/>
           </a:p>
@@ -2987,7 +2987,7 @@
           <a:p>
             <a:fld id="{6DB0D030-D7E2-46DF-89B5-F9C2519DD263}" type="slidenum">
               <a:rPr lang="pt-BR" smtClean="0"/>
-              <a:t>‹nº›</a:t>
+              <a:t>‹#›</a:t>
             </a:fld>
             <a:endParaRPr lang="pt-BR"/>
           </a:p>
@@ -5316,7 +5316,31 @@
                 <a:cs typeface="Khmer UI" panose="020B0502040204020203" pitchFamily="34" charset="0"/>
                 <a:sym typeface="Wingdings" panose="05000000000000000000" pitchFamily="2" charset="2"/>
               </a:rPr>
-              <a:t>valor_analisado</a:t>
+              <a:t>Cells</a:t>
+            </a:r>
+            <a:r>
+              <a:rPr lang="pt-BR" b="1" dirty="0">
+                <a:solidFill>
+                  <a:srgbClr val="FFC000"/>
+                </a:solidFill>
+                <a:latin typeface="Calibri (Corpo)"/>
+                <a:ea typeface="Yu Gothic Light" panose="020B0300000000000000" pitchFamily="34" charset="-128"/>
+                <a:cs typeface="Khmer UI" panose="020B0502040204020203" pitchFamily="34" charset="0"/>
+                <a:sym typeface="Wingdings" panose="05000000000000000000" pitchFamily="2" charset="2"/>
+              </a:rPr>
+              <a:t>(2,1).</a:t>
+            </a:r>
+            <a:r>
+              <a:rPr lang="pt-BR" b="1" dirty="0" err="1">
+                <a:solidFill>
+                  <a:srgbClr val="FFC000"/>
+                </a:solidFill>
+                <a:latin typeface="Calibri (Corpo)"/>
+                <a:ea typeface="Yu Gothic Light" panose="020B0300000000000000" pitchFamily="34" charset="-128"/>
+                <a:cs typeface="Khmer UI" panose="020B0502040204020203" pitchFamily="34" charset="0"/>
+                <a:sym typeface="Wingdings" panose="05000000000000000000" pitchFamily="2" charset="2"/>
+              </a:rPr>
+              <a:t>Value</a:t>
             </a:r>
             <a:endParaRPr lang="pt-BR" b="1" dirty="0">
               <a:solidFill>
@@ -5370,7 +5394,7 @@
                 <a:cs typeface="Khmer UI" panose="020B0502040204020203" pitchFamily="34" charset="0"/>
                 <a:sym typeface="Wingdings" panose="05000000000000000000" pitchFamily="2" charset="2"/>
               </a:rPr>
-              <a:t>caso1</a:t>
+              <a:t>&gt;= 7</a:t>
             </a:r>
           </a:p>
           <a:p>
@@ -5406,13 +5430,10 @@
                 <a:cs typeface="Khmer UI" panose="020B0502040204020203" pitchFamily="34" charset="0"/>
                 <a:sym typeface="Wingdings" panose="05000000000000000000" pitchFamily="2" charset="2"/>
               </a:rPr>
-              <a:t>	</a:t>
-            </a:r>
-          </a:p>
-          <a:p>
-            <a:pPr algn="just"/>
-            <a:r>
-              <a:rPr lang="pt-BR" b="1" dirty="0">
+              <a:t>		</a:t>
+            </a:r>
+            <a:r>
+              <a:rPr lang="pt-BR" b="1" dirty="0" err="1">
                 <a:solidFill>
                   <a:schemeClr val="tx1">
                     <a:lumMod val="65000"/>
@@ -5424,11 +5445,8 @@
                 <a:cs typeface="Khmer UI" panose="020B0502040204020203" pitchFamily="34" charset="0"/>
                 <a:sym typeface="Wingdings" panose="05000000000000000000" pitchFamily="2" charset="2"/>
               </a:rPr>
-              <a:t>	</a:t>
-            </a:r>
-          </a:p>
-          <a:p>
-            <a:pPr algn="just"/>
+              <a:t>Cells</a:t>
+            </a:r>
             <a:r>
               <a:rPr lang="pt-BR" b="1" dirty="0">
                 <a:solidFill>
@@ -5442,6 +5460,72 @@
                 <a:cs typeface="Khmer UI" panose="020B0502040204020203" pitchFamily="34" charset="0"/>
                 <a:sym typeface="Wingdings" panose="05000000000000000000" pitchFamily="2" charset="2"/>
               </a:rPr>
+              <a:t>(2,2).</a:t>
+            </a:r>
+            <a:r>
+              <a:rPr lang="pt-BR" b="1" dirty="0" err="1">
+                <a:solidFill>
+                  <a:schemeClr val="tx1">
+                    <a:lumMod val="65000"/>
+                    <a:lumOff val="35000"/>
+                  </a:schemeClr>
+                </a:solidFill>
+                <a:latin typeface="Calibri (Corpo)"/>
+                <a:ea typeface="Yu Gothic Light" panose="020B0300000000000000" pitchFamily="34" charset="-128"/>
+                <a:cs typeface="Khmer UI" panose="020B0502040204020203" pitchFamily="34" charset="0"/>
+                <a:sym typeface="Wingdings" panose="05000000000000000000" pitchFamily="2" charset="2"/>
+              </a:rPr>
+              <a:t>Value</a:t>
+            </a:r>
+            <a:r>
+              <a:rPr lang="pt-BR" b="1" dirty="0">
+                <a:solidFill>
+                  <a:schemeClr val="tx1">
+                    <a:lumMod val="65000"/>
+                    <a:lumOff val="35000"/>
+                  </a:schemeClr>
+                </a:solidFill>
+                <a:latin typeface="Calibri (Corpo)"/>
+                <a:ea typeface="Yu Gothic Light" panose="020B0300000000000000" pitchFamily="34" charset="-128"/>
+                <a:cs typeface="Khmer UI" panose="020B0502040204020203" pitchFamily="34" charset="0"/>
+                <a:sym typeface="Wingdings" panose="05000000000000000000" pitchFamily="2" charset="2"/>
+              </a:rPr>
+              <a:t> = “Aprovado”</a:t>
+            </a:r>
+          </a:p>
+          <a:p>
+            <a:pPr algn="just"/>
+            <a:r>
+              <a:rPr lang="pt-BR" b="1" dirty="0">
+                <a:solidFill>
+                  <a:schemeClr val="tx1">
+                    <a:lumMod val="65000"/>
+                    <a:lumOff val="35000"/>
+                  </a:schemeClr>
+                </a:solidFill>
+                <a:latin typeface="Calibri (Corpo)"/>
+                <a:ea typeface="Yu Gothic Light" panose="020B0300000000000000" pitchFamily="34" charset="-128"/>
+                <a:cs typeface="Khmer UI" panose="020B0502040204020203" pitchFamily="34" charset="0"/>
+                <a:sym typeface="Wingdings" panose="05000000000000000000" pitchFamily="2" charset="2"/>
+              </a:rPr>
+              <a:t>	</a:t>
+            </a:r>
+          </a:p>
+          <a:p>
+            <a:pPr algn="just"/>
+            <a:r>
+              <a:rPr lang="pt-BR" b="1" dirty="0">
+                <a:solidFill>
+                  <a:schemeClr val="tx1">
+                    <a:lumMod val="65000"/>
+                    <a:lumOff val="35000"/>
+                  </a:schemeClr>
+                </a:solidFill>
+                <a:latin typeface="Calibri (Corpo)"/>
+                <a:ea typeface="Yu Gothic Light" panose="020B0300000000000000" pitchFamily="34" charset="-128"/>
+                <a:cs typeface="Khmer UI" panose="020B0502040204020203" pitchFamily="34" charset="0"/>
+                <a:sym typeface="Wingdings" panose="05000000000000000000" pitchFamily="2" charset="2"/>
+              </a:rPr>
               <a:t>	Case </a:t>
             </a:r>
             <a:r>
@@ -5454,7 +5538,7 @@
                 <a:cs typeface="Khmer UI" panose="020B0502040204020203" pitchFamily="34" charset="0"/>
                 <a:sym typeface="Wingdings" panose="05000000000000000000" pitchFamily="2" charset="2"/>
               </a:rPr>
-              <a:t>caso2</a:t>
+              <a:t>&gt;= 5</a:t>
             </a:r>
             <a:endParaRPr lang="pt-BR" b="1" dirty="0">
               <a:solidFill>
@@ -5485,6 +5569,84 @@
                 <a:sym typeface="Wingdings" panose="05000000000000000000" pitchFamily="2" charset="2"/>
               </a:rPr>
               <a:t>	</a:t>
+            </a:r>
+          </a:p>
+          <a:p>
+            <a:pPr algn="just"/>
+            <a:r>
+              <a:rPr lang="pt-BR" b="1" dirty="0">
+                <a:solidFill>
+                  <a:schemeClr val="tx1">
+                    <a:lumMod val="65000"/>
+                    <a:lumOff val="35000"/>
+                  </a:schemeClr>
+                </a:solidFill>
+                <a:latin typeface="Calibri (Corpo)"/>
+                <a:ea typeface="Yu Gothic Light" panose="020B0300000000000000" pitchFamily="34" charset="-128"/>
+                <a:cs typeface="Khmer UI" panose="020B0502040204020203" pitchFamily="34" charset="0"/>
+                <a:sym typeface="Wingdings" panose="05000000000000000000" pitchFamily="2" charset="2"/>
+              </a:rPr>
+              <a:t>		</a:t>
+            </a:r>
+            <a:r>
+              <a:rPr lang="pt-BR" b="1" dirty="0" err="1">
+                <a:solidFill>
+                  <a:schemeClr val="tx1">
+                    <a:lumMod val="65000"/>
+                    <a:lumOff val="35000"/>
+                  </a:schemeClr>
+                </a:solidFill>
+                <a:latin typeface="Calibri (Corpo)"/>
+                <a:ea typeface="Yu Gothic Light" panose="020B0300000000000000" pitchFamily="34" charset="-128"/>
+                <a:cs typeface="Khmer UI" panose="020B0502040204020203" pitchFamily="34" charset="0"/>
+                <a:sym typeface="Wingdings" panose="05000000000000000000" pitchFamily="2" charset="2"/>
+              </a:rPr>
+              <a:t>Cells</a:t>
+            </a:r>
+            <a:r>
+              <a:rPr lang="pt-BR" b="1" dirty="0">
+                <a:solidFill>
+                  <a:schemeClr val="tx1">
+                    <a:lumMod val="65000"/>
+                    <a:lumOff val="35000"/>
+                  </a:schemeClr>
+                </a:solidFill>
+                <a:latin typeface="Calibri (Corpo)"/>
+                <a:ea typeface="Yu Gothic Light" panose="020B0300000000000000" pitchFamily="34" charset="-128"/>
+                <a:cs typeface="Khmer UI" panose="020B0502040204020203" pitchFamily="34" charset="0"/>
+                <a:sym typeface="Wingdings" panose="05000000000000000000" pitchFamily="2" charset="2"/>
+              </a:rPr>
+              <a:t>(2,2).</a:t>
+            </a:r>
+            <a:r>
+              <a:rPr lang="pt-BR" b="1" dirty="0" err="1">
+                <a:solidFill>
+                  <a:schemeClr val="tx1">
+                    <a:lumMod val="65000"/>
+                    <a:lumOff val="35000"/>
+                  </a:schemeClr>
+                </a:solidFill>
+                <a:latin typeface="Calibri (Corpo)"/>
+                <a:ea typeface="Yu Gothic Light" panose="020B0300000000000000" pitchFamily="34" charset="-128"/>
+                <a:cs typeface="Khmer UI" panose="020B0502040204020203" pitchFamily="34" charset="0"/>
+                <a:sym typeface="Wingdings" panose="05000000000000000000" pitchFamily="2" charset="2"/>
+              </a:rPr>
+              <a:t>Value</a:t>
+            </a:r>
+            <a:r>
+              <a:rPr lang="pt-BR" b="1" dirty="0">
+                <a:solidFill>
+                  <a:schemeClr val="tx1">
+                    <a:lumMod val="65000"/>
+                    <a:lumOff val="35000"/>
+                  </a:schemeClr>
+                </a:solidFill>
+                <a:latin typeface="Calibri (Corpo)"/>
+                <a:ea typeface="Yu Gothic Light" panose="020B0300000000000000" pitchFamily="34" charset="-128"/>
+                <a:cs typeface="Khmer UI" panose="020B0502040204020203" pitchFamily="34" charset="0"/>
+                <a:sym typeface="Wingdings" panose="05000000000000000000" pitchFamily="2" charset="2"/>
+              </a:rPr>
+              <a:t> = “Prova Final”</a:t>
             </a:r>
           </a:p>
           <a:p>
@@ -5504,21 +5666,6 @@
           </a:p>
           <a:p>
             <a:pPr algn="just"/>
-            <a:endParaRPr lang="pt-BR" b="1" dirty="0">
-              <a:solidFill>
-                <a:schemeClr val="tx1">
-                  <a:lumMod val="65000"/>
-                  <a:lumOff val="35000"/>
-                </a:schemeClr>
-              </a:solidFill>
-              <a:latin typeface="Calibri (Corpo)"/>
-              <a:ea typeface="Yu Gothic Light" panose="020B0300000000000000" pitchFamily="34" charset="-128"/>
-              <a:cs typeface="Khmer UI" panose="020B0502040204020203" pitchFamily="34" charset="0"/>
-              <a:sym typeface="Wingdings" panose="05000000000000000000" pitchFamily="2" charset="2"/>
-            </a:endParaRPr>
-          </a:p>
-          <a:p>
-            <a:pPr algn="just"/>
             <a:r>
               <a:rPr lang="pt-BR" b="1" dirty="0">
                 <a:solidFill>
@@ -5579,6 +5726,96 @@
           </a:p>
           <a:p>
             <a:pPr algn="just"/>
+            <a:r>
+              <a:rPr lang="pt-BR" b="1" dirty="0">
+                <a:solidFill>
+                  <a:schemeClr val="tx1">
+                    <a:lumMod val="65000"/>
+                    <a:lumOff val="35000"/>
+                  </a:schemeClr>
+                </a:solidFill>
+                <a:latin typeface="Calibri (Corpo)"/>
+                <a:ea typeface="Yu Gothic Light" panose="020B0300000000000000" pitchFamily="34" charset="-128"/>
+                <a:cs typeface="Khmer UI" panose="020B0502040204020203" pitchFamily="34" charset="0"/>
+                <a:sym typeface="Wingdings" panose="05000000000000000000" pitchFamily="2" charset="2"/>
+              </a:rPr>
+              <a:t>		</a:t>
+            </a:r>
+            <a:r>
+              <a:rPr lang="pt-BR" b="1" dirty="0" err="1">
+                <a:solidFill>
+                  <a:schemeClr val="tx1">
+                    <a:lumMod val="65000"/>
+                    <a:lumOff val="35000"/>
+                  </a:schemeClr>
+                </a:solidFill>
+                <a:latin typeface="Calibri (Corpo)"/>
+                <a:ea typeface="Yu Gothic Light" panose="020B0300000000000000" pitchFamily="34" charset="-128"/>
+                <a:cs typeface="Khmer UI" panose="020B0502040204020203" pitchFamily="34" charset="0"/>
+                <a:sym typeface="Wingdings" panose="05000000000000000000" pitchFamily="2" charset="2"/>
+              </a:rPr>
+              <a:t>Cells</a:t>
+            </a:r>
+            <a:r>
+              <a:rPr lang="pt-BR" b="1" dirty="0">
+                <a:solidFill>
+                  <a:schemeClr val="tx1">
+                    <a:lumMod val="65000"/>
+                    <a:lumOff val="35000"/>
+                  </a:schemeClr>
+                </a:solidFill>
+                <a:latin typeface="Calibri (Corpo)"/>
+                <a:ea typeface="Yu Gothic Light" panose="020B0300000000000000" pitchFamily="34" charset="-128"/>
+                <a:cs typeface="Khmer UI" panose="020B0502040204020203" pitchFamily="34" charset="0"/>
+                <a:sym typeface="Wingdings" panose="05000000000000000000" pitchFamily="2" charset="2"/>
+              </a:rPr>
+              <a:t>(2,2).</a:t>
+            </a:r>
+            <a:r>
+              <a:rPr lang="pt-BR" b="1" dirty="0" err="1">
+                <a:solidFill>
+                  <a:schemeClr val="tx1">
+                    <a:lumMod val="65000"/>
+                    <a:lumOff val="35000"/>
+                  </a:schemeClr>
+                </a:solidFill>
+                <a:latin typeface="Calibri (Corpo)"/>
+                <a:ea typeface="Yu Gothic Light" panose="020B0300000000000000" pitchFamily="34" charset="-128"/>
+                <a:cs typeface="Khmer UI" panose="020B0502040204020203" pitchFamily="34" charset="0"/>
+                <a:sym typeface="Wingdings" panose="05000000000000000000" pitchFamily="2" charset="2"/>
+              </a:rPr>
+              <a:t>Value</a:t>
+            </a:r>
+            <a:r>
+              <a:rPr lang="pt-BR" b="1" dirty="0">
+                <a:solidFill>
+                  <a:schemeClr val="tx1">
+                    <a:lumMod val="65000"/>
+                    <a:lumOff val="35000"/>
+                  </a:schemeClr>
+                </a:solidFill>
+                <a:latin typeface="Calibri (Corpo)"/>
+                <a:ea typeface="Yu Gothic Light" panose="020B0300000000000000" pitchFamily="34" charset="-128"/>
+                <a:cs typeface="Khmer UI" panose="020B0502040204020203" pitchFamily="34" charset="0"/>
+                <a:sym typeface="Wingdings" panose="05000000000000000000" pitchFamily="2" charset="2"/>
+              </a:rPr>
+              <a:t>= </a:t>
+            </a:r>
+            <a:r>
+              <a:rPr lang="pt-BR" b="1">
+                <a:solidFill>
+                  <a:schemeClr val="tx1">
+                    <a:lumMod val="65000"/>
+                    <a:lumOff val="35000"/>
+                  </a:schemeClr>
+                </a:solidFill>
+                <a:latin typeface="Calibri (Corpo)"/>
+                <a:ea typeface="Yu Gothic Light" panose="020B0300000000000000" pitchFamily="34" charset="-128"/>
+                <a:cs typeface="Khmer UI" panose="020B0502040204020203" pitchFamily="34" charset="0"/>
+                <a:sym typeface="Wingdings" panose="05000000000000000000" pitchFamily="2" charset="2"/>
+              </a:rPr>
+              <a:t>“Reprovado”</a:t>
+            </a:r>
             <a:endParaRPr lang="pt-BR" b="1" dirty="0">
               <a:solidFill>
                 <a:schemeClr val="tx1">

</xml_diff>